<commit_message>
Plan de Gestión de Configuración
</commit_message>
<xml_diff>
--- a/Area_de_Proceso-CM/PGC/PGC_V1.0_2015.pptx
+++ b/Area_de_Proceso-CM/PGC/PGC_V1.0_2015.pptx
@@ -4316,7 +4316,7 @@
           <a:p>
             <a:fld id="{56F99C03-A70A-4B29-84B2-81DDC41A991A}" type="datetimeFigureOut">
               <a:rPr lang="es-PE" smtClean="0"/>
-              <a:t>18/10/2015</a:t>
+              <a:t>20/10/2015</a:t>
             </a:fld>
             <a:endParaRPr lang="es-PE"/>
           </a:p>
@@ -5868,7 +5868,7 @@
           <a:p>
             <a:fld id="{216C5678-EE20-4FA5-88E2-6E0BD67A2E26}" type="datetime1">
               <a:rPr lang="en-US" smtClean="0"/>
-              <a:t>10/18/2015</a:t>
+              <a:t>10/20/2015</a:t>
             </a:fld>
             <a:endParaRPr lang="en-US" dirty="0"/>
           </a:p>
@@ -6038,7 +6038,7 @@
           <a:p>
             <a:fld id="{EA051B39-B140-43FE-96DB-472A2B59CE7C}" type="datetime1">
               <a:rPr lang="en-US" smtClean="0"/>
-              <a:t>10/18/2015</a:t>
+              <a:t>10/20/2015</a:t>
             </a:fld>
             <a:endParaRPr lang="en-US"/>
           </a:p>
@@ -6218,7 +6218,7 @@
           <a:p>
             <a:fld id="{DA600BB2-27C5-458B-ABCE-839C88CF47CE}" type="datetime1">
               <a:rPr lang="en-US" smtClean="0"/>
-              <a:t>10/18/2015</a:t>
+              <a:t>10/20/2015</a:t>
             </a:fld>
             <a:endParaRPr lang="en-US"/>
           </a:p>
@@ -6406,7 +6406,7 @@
           <a:p>
             <a:fld id="{B11D738E-8962-435F-8C43-147B8DD7E819}" type="datetime1">
               <a:rPr lang="en-US" smtClean="0"/>
-              <a:t>10/18/2015</a:t>
+              <a:t>10/20/2015</a:t>
             </a:fld>
             <a:endParaRPr lang="en-US"/>
           </a:p>
@@ -6673,7 +6673,7 @@
           <a:p>
             <a:fld id="{09CAEA93-55E7-4DA9-90C2-089A26EEFEC4}" type="datetime1">
               <a:rPr lang="en-US" smtClean="0"/>
-              <a:t>10/18/2015</a:t>
+              <a:t>10/20/2015</a:t>
             </a:fld>
             <a:endParaRPr lang="en-US"/>
           </a:p>
@@ -7026,7 +7026,7 @@
           <a:p>
             <a:fld id="{E34CF3C7-6809-4F39-BD67-A75817BDDE0A}" type="datetime1">
               <a:rPr lang="en-US" smtClean="0"/>
-              <a:t>10/18/2015</a:t>
+              <a:t>10/20/2015</a:t>
             </a:fld>
             <a:endParaRPr lang="en-US"/>
           </a:p>
@@ -7339,7 +7339,7 @@
           <a:p>
             <a:fld id="{F7EAEB24-CE78-465C-A726-91D0868FA48F}" type="datetime1">
               <a:rPr lang="en-US" smtClean="0"/>
-              <a:t>10/18/2015</a:t>
+              <a:t>10/20/2015</a:t>
             </a:fld>
             <a:endParaRPr lang="en-US"/>
           </a:p>
@@ -7571,7 +7571,7 @@
           <a:p>
             <a:fld id="{40BAADF0-1749-4E8B-9691-B44A5F8C0895}" type="datetime1">
               <a:rPr lang="en-US" smtClean="0"/>
-              <a:t>10/18/2015</a:t>
+              <a:t>10/20/2015</a:t>
             </a:fld>
             <a:endParaRPr lang="en-US"/>
           </a:p>
@@ -7666,7 +7666,7 @@
           <a:p>
             <a:fld id="{A8AF628A-A867-4937-BBE5-207DB6F9C51A}" type="datetime1">
               <a:rPr lang="en-US" smtClean="0"/>
-              <a:t>10/18/2015</a:t>
+              <a:t>10/20/2015</a:t>
             </a:fld>
             <a:endParaRPr lang="en-US"/>
           </a:p>
@@ -7959,7 +7959,7 @@
           <a:p>
             <a:fld id="{118BBB94-68E6-4675-A946-F1C5994EDBD7}" type="datetime1">
               <a:rPr lang="en-US" smtClean="0"/>
-              <a:t>10/18/2015</a:t>
+              <a:t>10/20/2015</a:t>
             </a:fld>
             <a:endParaRPr lang="en-US"/>
           </a:p>
@@ -8233,7 +8233,7 @@
           <a:p>
             <a:fld id="{DC3B8377-21E3-4835-B75D-4E2847E2750F}" type="datetime1">
               <a:rPr lang="en-US" smtClean="0"/>
-              <a:t>10/18/2015</a:t>
+              <a:t>10/20/2015</a:t>
             </a:fld>
             <a:endParaRPr lang="en-US"/>
           </a:p>
@@ -8448,7 +8448,7 @@
           <a:p>
             <a:fld id="{B0C4986D-6BE9-4264-908F-02DB36FD8D6C}" type="datetime1">
               <a:rPr lang="en-US" smtClean="0"/>
-              <a:t>10/18/2015</a:t>
+              <a:t>10/20/2015</a:t>
             </a:fld>
             <a:endParaRPr lang="en-US" dirty="0"/>
           </a:p>
@@ -8989,7 +8989,7 @@
           <a:p>
             <a:fld id="{216C5678-EE20-4FA5-88E2-6E0BD67A2E26}" type="datetime1">
               <a:rPr lang="en-US" smtClean="0"/>
-              <a:t>10/18/2015</a:t>
+              <a:t>10/20/2015</a:t>
             </a:fld>
             <a:endParaRPr lang="en-US" dirty="0"/>
           </a:p>
@@ -9499,7 +9499,7 @@
           <a:p>
             <a:fld id="{216C5678-EE20-4FA5-88E2-6E0BD67A2E26}" type="datetime1">
               <a:rPr lang="en-US" smtClean="0"/>
-              <a:t>10/18/2015</a:t>
+              <a:t>10/20/2015</a:t>
             </a:fld>
             <a:endParaRPr lang="en-US" dirty="0"/>
           </a:p>
@@ -10003,7 +10003,7 @@
           <a:p>
             <a:fld id="{216C5678-EE20-4FA5-88E2-6E0BD67A2E26}" type="datetime1">
               <a:rPr lang="en-US" smtClean="0"/>
-              <a:t>10/18/2015</a:t>
+              <a:t>10/20/2015</a:t>
             </a:fld>
             <a:endParaRPr lang="en-US" dirty="0"/>
           </a:p>
@@ -10194,7 +10194,7 @@
           <a:p>
             <a:fld id="{216C5678-EE20-4FA5-88E2-6E0BD67A2E26}" type="datetime1">
               <a:rPr lang="en-US" smtClean="0"/>
-              <a:t>10/18/2015</a:t>
+              <a:t>10/20/2015</a:t>
             </a:fld>
             <a:endParaRPr lang="en-US" dirty="0"/>
           </a:p>
@@ -10446,7 +10446,7 @@
           <a:p>
             <a:fld id="{216C5678-EE20-4FA5-88E2-6E0BD67A2E26}" type="datetime1">
               <a:rPr lang="en-US" smtClean="0"/>
-              <a:t>10/18/2015</a:t>
+              <a:t>10/20/2015</a:t>
             </a:fld>
             <a:endParaRPr lang="en-US" dirty="0"/>
           </a:p>
@@ -12566,7 +12566,7 @@
           <p:nvPr>
             <p:extLst>
               <p:ext uri="{D42A27DB-BD31-4B8C-83A1-F6EECF244321}">
-                <p14:modId xmlns:p14="http://schemas.microsoft.com/office/powerpoint/2010/main" val="4043783086"/>
+                <p14:modId xmlns:p14="http://schemas.microsoft.com/office/powerpoint/2010/main" val="623751682"/>
               </p:ext>
             </p:extLst>
           </p:nvPr>
@@ -12924,35 +12924,6 @@
                     <a:bodyPr/>
                     <a:lstStyle/>
                     <a:p>
-                      <a:pPr marL="0" marR="0" lvl="0" indent="0" algn="just" defTabSz="457200" rtl="0" eaLnBrk="1" fontAlgn="base" latinLnBrk="0" hangingPunct="1">
-                        <a:lnSpc>
-                          <a:spcPct val="100000"/>
-                        </a:lnSpc>
-                        <a:spcBef>
-                          <a:spcPct val="20000"/>
-                        </a:spcBef>
-                        <a:spcAft>
-                          <a:spcPct val="0"/>
-                        </a:spcAft>
-                        <a:buClrTx/>
-                        <a:buSzTx/>
-                        <a:buFontTx/>
-                        <a:buNone/>
-                        <a:tabLst/>
-                      </a:pPr>
-                      <a:r>
-                        <a:rPr lang="es-PE" sz="1200" kern="1200" dirty="0" smtClean="0">
-                          <a:solidFill>
-                            <a:schemeClr val="dk1"/>
-                          </a:solidFill>
-                          <a:latin typeface="+mj-lt"/>
-                          <a:ea typeface="Verdana" panose="020B0604030504040204" pitchFamily="34" charset="0"/>
-                          <a:cs typeface="Verdana" panose="020B0604030504040204" pitchFamily="34" charset="0"/>
-                        </a:rPr>
-                        <a:t>Plantillas:</a:t>
-                      </a:r>
-                    </a:p>
-                    <a:p>
                       <a:pPr marL="92075" marR="0" lvl="0" indent="-92075" algn="l" defTabSz="457200" rtl="0" eaLnBrk="1" fontAlgn="base" latinLnBrk="0" hangingPunct="1">
                         <a:lnSpc>
                           <a:spcPct val="100000"/>
@@ -12989,7 +12960,18 @@
                           <a:ea typeface="Verdana" panose="020B0604030504040204" pitchFamily="34" charset="0"/>
                           <a:cs typeface="Verdana" panose="020B0604030504040204" pitchFamily="34" charset="0"/>
                         </a:rPr>
-                        <a:t> Plan del Proyecto</a:t>
+                        <a:t> </a:t>
+                      </a:r>
+                      <a:r>
+                        <a:rPr lang="es-PE" sz="1200" kern="1200" dirty="0" smtClean="0">
+                          <a:solidFill>
+                            <a:schemeClr val="dk1"/>
+                          </a:solidFill>
+                          <a:latin typeface="+mj-lt"/>
+                          <a:ea typeface="Verdana" panose="020B0604030504040204" pitchFamily="34" charset="0"/>
+                          <a:cs typeface="Verdana" panose="020B0604030504040204" pitchFamily="34" charset="0"/>
+                        </a:rPr>
+                        <a:t>Plan del Proyecto</a:t>
                       </a:r>
                     </a:p>
                     <a:p>
@@ -13408,7 +13390,7 @@
                           <a:ea typeface="Verdana" panose="020B0604030504040204" pitchFamily="34" charset="0"/>
                           <a:cs typeface="Verdana" panose="020B0604030504040204" pitchFamily="34" charset="0"/>
                         </a:rPr>
-                        <a:t>Solicitud</a:t>
+                        <a:t>IAUDICM Solicitud</a:t>
                       </a:r>
                       <a:r>
                         <a:rPr lang="es-ES" sz="1200" kern="1200" baseline="0" dirty="0" smtClean="0">
@@ -13419,7 +13401,18 @@
                           <a:ea typeface="Verdana" panose="020B0604030504040204" pitchFamily="34" charset="0"/>
                           <a:cs typeface="Verdana" panose="020B0604030504040204" pitchFamily="34" charset="0"/>
                         </a:rPr>
-                        <a:t> de Auditoria</a:t>
+                        <a:t> </a:t>
+                      </a:r>
+                      <a:r>
+                        <a:rPr lang="es-ES" sz="1200" kern="1200" baseline="0" dirty="0" smtClean="0">
+                          <a:solidFill>
+                            <a:schemeClr val="tx1"/>
+                          </a:solidFill>
+                          <a:latin typeface="+mj-lt"/>
+                          <a:ea typeface="Verdana" panose="020B0604030504040204" pitchFamily="34" charset="0"/>
+                          <a:cs typeface="Verdana" panose="020B0604030504040204" pitchFamily="34" charset="0"/>
+                        </a:rPr>
+                        <a:t>de Auditoria</a:t>
                       </a:r>
                       <a:endParaRPr lang="es-ES" sz="1200" kern="1200" dirty="0" smtClean="0">
                         <a:solidFill>
@@ -13463,7 +13456,7 @@
                           <a:ea typeface="Verdana" panose="020B0604030504040204" pitchFamily="34" charset="0"/>
                           <a:cs typeface="Verdana" panose="020B0604030504040204" pitchFamily="34" charset="0"/>
                         </a:rPr>
-                        <a:t>Inform</a:t>
+                        <a:t>IAVQUI Inform</a:t>
                       </a:r>
                       <a:r>
                         <a:rPr lang="es-ES" sz="1200" kern="1200" baseline="0" dirty="0" smtClean="0">
@@ -13474,7 +13467,7 @@
                           <a:ea typeface="Verdana" panose="020B0604030504040204" pitchFamily="34" charset="0"/>
                           <a:cs typeface="Verdana" panose="020B0604030504040204" pitchFamily="34" charset="0"/>
                         </a:rPr>
-                        <a:t>e quincenal del proyecto</a:t>
+                        <a:t>e de Avance Quincenal</a:t>
                       </a:r>
                       <a:endParaRPr lang="es-ES" sz="1200" kern="1200" dirty="0" smtClean="0">
                         <a:solidFill>
@@ -13515,7 +13508,7 @@
           <a:p>
             <a:fld id="{216C5678-EE20-4FA5-88E2-6E0BD67A2E26}" type="datetime1">
               <a:rPr lang="en-US" smtClean="0"/>
-              <a:t>10/18/2015</a:t>
+              <a:t>10/20/2015</a:t>
             </a:fld>
             <a:endParaRPr lang="en-US" dirty="0"/>
           </a:p>
@@ -13878,7 +13871,7 @@
           <a:p>
             <a:fld id="{216C5678-EE20-4FA5-88E2-6E0BD67A2E26}" type="datetime1">
               <a:rPr lang="en-US" smtClean="0"/>
-              <a:t>10/18/2015</a:t>
+              <a:t>10/20/2015</a:t>
             </a:fld>
             <a:endParaRPr lang="en-US" dirty="0"/>
           </a:p>
@@ -14495,15 +14488,6 @@
               <a:lstStyle/>
               <a:p>
                 <a:pPr marL="93663" algn="ctr"/>
-                <a:r>
-                  <a:rPr lang="es-MX" altLang="es-PE" sz="1100" b="1" dirty="0">
-                    <a:solidFill>
-                      <a:schemeClr val="bg1"/>
-                    </a:solidFill>
-                    <a:latin typeface="Arial" panose="020B0604020202020204" pitchFamily="34" charset="0"/>
-                  </a:rPr>
-                  <a:t>SOLACC </a:t>
-                </a:r>
                 <a:r>
                   <a:rPr lang="es-MX" altLang="es-PE" sz="1100" b="1" dirty="0" smtClean="0">
                     <a:solidFill>
@@ -17095,7 +17079,7 @@
           <a:p>
             <a:fld id="{216C5678-EE20-4FA5-88E2-6E0BD67A2E26}" type="datetime1">
               <a:rPr lang="en-US" smtClean="0"/>
-              <a:t>10/18/2015</a:t>
+              <a:t>10/20/2015</a:t>
             </a:fld>
             <a:endParaRPr lang="en-US" dirty="0"/>
           </a:p>
@@ -17460,7 +17444,7 @@
           <a:p>
             <a:fld id="{216C5678-EE20-4FA5-88E2-6E0BD67A2E26}" type="datetime1">
               <a:rPr lang="en-US" smtClean="0"/>
-              <a:t>10/18/2015</a:t>
+              <a:t>10/20/2015</a:t>
             </a:fld>
             <a:endParaRPr lang="en-US" dirty="0"/>
           </a:p>
@@ -17666,7 +17650,7 @@
           <a:p>
             <a:fld id="{216C5678-EE20-4FA5-88E2-6E0BD67A2E26}" type="datetime1">
               <a:rPr lang="en-US" smtClean="0"/>
-              <a:t>10/18/2015</a:t>
+              <a:t>10/20/2015</a:t>
             </a:fld>
             <a:endParaRPr lang="en-US" dirty="0"/>
           </a:p>
@@ -20609,7 +20593,7 @@
           <p:nvPr>
             <p:extLst>
               <p:ext uri="{D42A27DB-BD31-4B8C-83A1-F6EECF244321}">
-                <p14:modId xmlns:p14="http://schemas.microsoft.com/office/powerpoint/2010/main" val="1166459482"/>
+                <p14:modId xmlns:p14="http://schemas.microsoft.com/office/powerpoint/2010/main" val="838981707"/>
               </p:ext>
             </p:extLst>
           </p:nvPr>
@@ -21299,7 +21283,18 @@
                           <a:ea typeface="Verdana" panose="020B0604030504040204" pitchFamily="34" charset="0"/>
                           <a:cs typeface="Verdana" panose="020B0604030504040204" pitchFamily="34" charset="0"/>
                         </a:rPr>
-                        <a:t>Registro de Ítems de Configuración</a:t>
+                        <a:t>REGITCON Registro </a:t>
+                      </a:r>
+                      <a:r>
+                        <a:rPr lang="es-PE" sz="1200" kern="1200" dirty="0" smtClean="0">
+                          <a:solidFill>
+                            <a:schemeClr val="dk1"/>
+                          </a:solidFill>
+                          <a:latin typeface="+mj-lt"/>
+                          <a:ea typeface="Verdana" panose="020B0604030504040204" pitchFamily="34" charset="0"/>
+                          <a:cs typeface="Verdana" panose="020B0604030504040204" pitchFamily="34" charset="0"/>
+                        </a:rPr>
+                        <a:t>de Ítems de Configuración</a:t>
                       </a:r>
                       <a:endParaRPr lang="es-ES" sz="1200" kern="1200" dirty="0" smtClean="0">
                         <a:solidFill>
@@ -21583,7 +21578,18 @@
                           <a:ea typeface="Verdana" panose="020B0604030504040204" pitchFamily="34" charset="0"/>
                           <a:cs typeface="Verdana" panose="020B0604030504040204" pitchFamily="34" charset="0"/>
                         </a:rPr>
-                        <a:t>Registro de Ítems de Configuración</a:t>
+                        <a:t>REGITCON Registro </a:t>
+                      </a:r>
+                      <a:r>
+                        <a:rPr lang="es-PE" sz="1200" kern="1200" dirty="0" smtClean="0">
+                          <a:solidFill>
+                            <a:schemeClr val="dk1"/>
+                          </a:solidFill>
+                          <a:latin typeface="+mj-lt"/>
+                          <a:ea typeface="Verdana" panose="020B0604030504040204" pitchFamily="34" charset="0"/>
+                          <a:cs typeface="Verdana" panose="020B0604030504040204" pitchFamily="34" charset="0"/>
+                        </a:rPr>
+                        <a:t>de Ítems de Configuración</a:t>
                       </a:r>
                       <a:endParaRPr lang="es-ES" sz="1200" kern="1200" dirty="0" smtClean="0">
                         <a:solidFill>
@@ -21668,7 +21674,7 @@
           <a:p>
             <a:fld id="{216C5678-EE20-4FA5-88E2-6E0BD67A2E26}" type="datetime1">
               <a:rPr lang="en-US" smtClean="0"/>
-              <a:t>10/18/2015</a:t>
+              <a:t>10/20/2015</a:t>
             </a:fld>
             <a:endParaRPr lang="en-US" dirty="0"/>
           </a:p>
@@ -21921,7 +21927,7 @@
           <p:nvPr>
             <p:extLst>
               <p:ext uri="{D42A27DB-BD31-4B8C-83A1-F6EECF244321}">
-                <p14:modId xmlns:p14="http://schemas.microsoft.com/office/powerpoint/2010/main" val="1712041541"/>
+                <p14:modId xmlns:p14="http://schemas.microsoft.com/office/powerpoint/2010/main" val="1387243700"/>
               </p:ext>
             </p:extLst>
           </p:nvPr>
@@ -22303,7 +22309,18 @@
                           <a:ea typeface="Verdana" panose="020B0604030504040204" pitchFamily="34" charset="0"/>
                           <a:cs typeface="Verdana" panose="020B0604030504040204" pitchFamily="34" charset="0"/>
                         </a:rPr>
-                        <a:t>Registro de Ítems de Configuración</a:t>
+                        <a:t>REGITCON Registro </a:t>
+                      </a:r>
+                      <a:r>
+                        <a:rPr lang="es-PE" sz="1200" kern="1200" dirty="0" smtClean="0">
+                          <a:solidFill>
+                            <a:schemeClr val="dk1"/>
+                          </a:solidFill>
+                          <a:latin typeface="+mj-lt"/>
+                          <a:ea typeface="Verdana" panose="020B0604030504040204" pitchFamily="34" charset="0"/>
+                          <a:cs typeface="Verdana" panose="020B0604030504040204" pitchFamily="34" charset="0"/>
+                        </a:rPr>
+                        <a:t>de Ítems de Configuración</a:t>
                       </a:r>
                       <a:endParaRPr lang="es-ES" sz="1200" kern="1200" dirty="0" smtClean="0">
                         <a:solidFill>
@@ -22598,7 +22615,18 @@
                           <a:ea typeface="Verdana" panose="020B0604030504040204" pitchFamily="34" charset="0"/>
                           <a:cs typeface="Verdana" panose="020B0604030504040204" pitchFamily="34" charset="0"/>
                         </a:rPr>
-                        <a:t>Registro de Ítems de Configuración</a:t>
+                        <a:t>REGITCON Registro </a:t>
+                      </a:r>
+                      <a:r>
+                        <a:rPr lang="es-PE" sz="1200" kern="1200" dirty="0" smtClean="0">
+                          <a:solidFill>
+                            <a:schemeClr val="dk1"/>
+                          </a:solidFill>
+                          <a:latin typeface="+mj-lt"/>
+                          <a:ea typeface="Verdana" panose="020B0604030504040204" pitchFamily="34" charset="0"/>
+                          <a:cs typeface="Verdana" panose="020B0604030504040204" pitchFamily="34" charset="0"/>
+                        </a:rPr>
+                        <a:t>de Ítems de Configuración</a:t>
                       </a:r>
                       <a:endParaRPr lang="es-ES" sz="1200" kern="1200" dirty="0" smtClean="0">
                         <a:solidFill>
@@ -22941,7 +22969,7 @@
           <a:p>
             <a:fld id="{216C5678-EE20-4FA5-88E2-6E0BD67A2E26}" type="datetime1">
               <a:rPr lang="en-US" smtClean="0"/>
-              <a:t>10/18/2015</a:t>
+              <a:t>10/20/2015</a:t>
             </a:fld>
             <a:endParaRPr lang="en-US" dirty="0"/>
           </a:p>
@@ -23281,7 +23309,7 @@
           <a:p>
             <a:fld id="{216C5678-EE20-4FA5-88E2-6E0BD67A2E26}" type="datetime1">
               <a:rPr lang="en-US" smtClean="0"/>
-              <a:t>10/18/2015</a:t>
+              <a:t>10/20/2015</a:t>
             </a:fld>
             <a:endParaRPr lang="en-US" dirty="0"/>
           </a:p>
@@ -23533,7 +23561,7 @@
           <a:p>
             <a:fld id="{216C5678-EE20-4FA5-88E2-6E0BD67A2E26}" type="datetime1">
               <a:rPr lang="en-US" smtClean="0"/>
-              <a:t>10/18/2015</a:t>
+              <a:t>10/20/2015</a:t>
             </a:fld>
             <a:endParaRPr lang="en-US" dirty="0"/>
           </a:p>
@@ -23782,7 +23810,7 @@
           <a:p>
             <a:fld id="{216C5678-EE20-4FA5-88E2-6E0BD67A2E26}" type="datetime1">
               <a:rPr lang="en-US" smtClean="0"/>
-              <a:t>10/18/2015</a:t>
+              <a:t>10/20/2015</a:t>
             </a:fld>
             <a:endParaRPr lang="en-US" dirty="0"/>
           </a:p>
@@ -23947,7 +23975,7 @@
           <p:nvPr>
             <p:extLst>
               <p:ext uri="{D42A27DB-BD31-4B8C-83A1-F6EECF244321}">
-                <p14:modId xmlns:p14="http://schemas.microsoft.com/office/powerpoint/2010/main" val="1904408945"/>
+                <p14:modId xmlns:p14="http://schemas.microsoft.com/office/powerpoint/2010/main" val="2106961461"/>
               </p:ext>
             </p:extLst>
           </p:nvPr>
@@ -24459,7 +24487,18 @@
                           <a:ea typeface="Verdana" panose="020B0604030504040204" pitchFamily="34" charset="0"/>
                           <a:cs typeface="Verdana" panose="020B0604030504040204" pitchFamily="34" charset="0"/>
                         </a:rPr>
-                        <a:t>Registro de Ítems de Configuración</a:t>
+                        <a:t>REGITCON Registro </a:t>
+                      </a:r>
+                      <a:r>
+                        <a:rPr lang="es-PE" sz="1200" b="1" kern="1200" dirty="0" smtClean="0">
+                          <a:solidFill>
+                            <a:schemeClr val="dk1"/>
+                          </a:solidFill>
+                          <a:latin typeface="+mj-lt"/>
+                          <a:ea typeface="Verdana" panose="020B0604030504040204" pitchFamily="34" charset="0"/>
+                          <a:cs typeface="Verdana" panose="020B0604030504040204" pitchFamily="34" charset="0"/>
+                        </a:rPr>
+                        <a:t>de Ítems de Configuración</a:t>
                       </a:r>
                       <a:endParaRPr lang="es-ES" sz="1200" b="1" kern="1200" dirty="0" smtClean="0">
                         <a:solidFill>
@@ -24818,7 +24857,40 @@
                           <a:ea typeface="Verdana" panose="020B0604030504040204" pitchFamily="34" charset="0"/>
                           <a:cs typeface="Verdana" panose="020B0604030504040204" pitchFamily="34" charset="0"/>
                         </a:rPr>
-                        <a:t>Plan del Proyecto</a:t>
+                        <a:t>PPROY</a:t>
+                      </a:r>
+                      <a:r>
+                        <a:rPr lang="es-ES" sz="1200" b="1" kern="1200" baseline="0" dirty="0" smtClean="0">
+                          <a:solidFill>
+                            <a:schemeClr val="dk1"/>
+                          </a:solidFill>
+                          <a:latin typeface="+mj-lt"/>
+                          <a:ea typeface="Verdana" panose="020B0604030504040204" pitchFamily="34" charset="0"/>
+                          <a:cs typeface="Verdana" panose="020B0604030504040204" pitchFamily="34" charset="0"/>
+                        </a:rPr>
+                        <a:t> </a:t>
+                      </a:r>
+                      <a:r>
+                        <a:rPr lang="es-ES" sz="1200" b="1" kern="1200" dirty="0" smtClean="0">
+                          <a:solidFill>
+                            <a:schemeClr val="dk1"/>
+                          </a:solidFill>
+                          <a:latin typeface="+mj-lt"/>
+                          <a:ea typeface="Verdana" panose="020B0604030504040204" pitchFamily="34" charset="0"/>
+                          <a:cs typeface="Verdana" panose="020B0604030504040204" pitchFamily="34" charset="0"/>
+                        </a:rPr>
+                        <a:t>Plan </a:t>
+                      </a:r>
+                      <a:r>
+                        <a:rPr lang="es-ES" sz="1200" b="1" kern="1200" dirty="0" smtClean="0">
+                          <a:solidFill>
+                            <a:schemeClr val="dk1"/>
+                          </a:solidFill>
+                          <a:latin typeface="+mj-lt"/>
+                          <a:ea typeface="Verdana" panose="020B0604030504040204" pitchFamily="34" charset="0"/>
+                          <a:cs typeface="Verdana" panose="020B0604030504040204" pitchFamily="34" charset="0"/>
+                        </a:rPr>
+                        <a:t>del Proyecto</a:t>
                       </a:r>
                     </a:p>
                   </a:txBody>
@@ -25144,7 +25216,18 @@
                           <a:ea typeface="Verdana" panose="020B0604030504040204" pitchFamily="34" charset="0"/>
                           <a:cs typeface="Verdana" panose="020B0604030504040204" pitchFamily="34" charset="0"/>
                         </a:rPr>
-                        <a:t>Formato de Solicitud de Accesos</a:t>
+                        <a:t>SOLACC Solicitud </a:t>
+                      </a:r>
+                      <a:r>
+                        <a:rPr lang="es-PE" sz="1200" b="1" kern="1200" dirty="0" smtClean="0">
+                          <a:solidFill>
+                            <a:schemeClr val="dk1"/>
+                          </a:solidFill>
+                          <a:latin typeface="+mj-lt"/>
+                          <a:ea typeface="Verdana" panose="020B0604030504040204" pitchFamily="34" charset="0"/>
+                          <a:cs typeface="Verdana" panose="020B0604030504040204" pitchFamily="34" charset="0"/>
+                        </a:rPr>
+                        <a:t>de Accesos</a:t>
                       </a:r>
                       <a:endParaRPr lang="es-ES" sz="1200" b="1" kern="1200" dirty="0" smtClean="0">
                         <a:solidFill>
@@ -25555,7 +25638,7 @@
           <a:p>
             <a:fld id="{216C5678-EE20-4FA5-88E2-6E0BD67A2E26}" type="datetime1">
               <a:rPr lang="en-US" smtClean="0"/>
-              <a:t>10/18/2015</a:t>
+              <a:t>10/20/2015</a:t>
             </a:fld>
             <a:endParaRPr lang="en-US" dirty="0"/>
           </a:p>
@@ -26068,14 +26151,6 @@
                         </a:rPr>
                         <a:t>Roger Apaestegui</a:t>
                       </a:r>
-                      <a:endParaRPr lang="es-ES" sz="1200" b="1" kern="1200" dirty="0" smtClean="0">
-                        <a:solidFill>
-                          <a:schemeClr val="dk1"/>
-                        </a:solidFill>
-                        <a:latin typeface="+mj-lt"/>
-                        <a:ea typeface="Verdana" panose="020B0604030504040204" pitchFamily="34" charset="0"/>
-                        <a:cs typeface="Verdana" panose="020B0604030504040204" pitchFamily="34" charset="0"/>
-                      </a:endParaRPr>
                     </a:p>
                   </a:txBody>
                   <a:tcPr marT="45702" marB="45702" anchor="ctr" horzOverflow="overflow"/>
@@ -26212,18 +26287,7 @@
                           <a:ea typeface="Verdana" panose="020B0604030504040204" pitchFamily="34" charset="0"/>
                           <a:cs typeface="Verdana" panose="020B0604030504040204" pitchFamily="34" charset="0"/>
                         </a:rPr>
-                        <a:t> </a:t>
-                      </a:r>
-                      <a:r>
-                        <a:rPr lang="es-ES" sz="1200" b="1" kern="1200" baseline="0" smtClean="0">
-                          <a:solidFill>
-                            <a:schemeClr val="dk1"/>
-                          </a:solidFill>
-                          <a:latin typeface="+mj-lt"/>
-                          <a:ea typeface="Verdana" panose="020B0604030504040204" pitchFamily="34" charset="0"/>
-                          <a:cs typeface="Verdana" panose="020B0604030504040204" pitchFamily="34" charset="0"/>
-                        </a:rPr>
-                        <a:t>Sáenz Tarazona</a:t>
+                        <a:t> Sáenz Tarazona</a:t>
                       </a:r>
                       <a:endParaRPr lang="es-ES" sz="1200" b="1" kern="1200" dirty="0" smtClean="0">
                         <a:solidFill>
@@ -27660,7 +27724,7 @@
           <a:p>
             <a:fld id="{216C5678-EE20-4FA5-88E2-6E0BD67A2E26}" type="datetime1">
               <a:rPr lang="en-US" smtClean="0"/>
-              <a:t>10/18/2015</a:t>
+              <a:t>10/20/2015</a:t>
             </a:fld>
             <a:endParaRPr lang="en-US" dirty="0"/>
           </a:p>
@@ -28219,7 +28283,7 @@
             <a:fld id="{216C5678-EE20-4FA5-88E2-6E0BD67A2E26}" type="datetime1">
               <a:rPr lang="en-US" smtClean="0"/>
               <a:pPr/>
-              <a:t>10/18/2015</a:t>
+              <a:t>10/20/2015</a:t>
             </a:fld>
             <a:endParaRPr lang="en-US" dirty="0"/>
           </a:p>
@@ -28307,7 +28371,7 @@
           <a:p>
             <a:fld id="{216C5678-EE20-4FA5-88E2-6E0BD67A2E26}" type="datetime1">
               <a:rPr lang="en-US" smtClean="0"/>
-              <a:t>10/18/2015</a:t>
+              <a:t>10/20/2015</a:t>
             </a:fld>
             <a:endParaRPr lang="en-US" dirty="0"/>
           </a:p>
@@ -30497,7 +30561,7 @@
           <a:p>
             <a:fld id="{216C5678-EE20-4FA5-88E2-6E0BD67A2E26}" type="datetime1">
               <a:rPr lang="en-US" smtClean="0"/>
-              <a:t>10/18/2015</a:t>
+              <a:t>10/20/2015</a:t>
             </a:fld>
             <a:endParaRPr lang="en-US" dirty="0"/>
           </a:p>
@@ -30835,7 +30899,7 @@
           <a:p>
             <a:fld id="{216C5678-EE20-4FA5-88E2-6E0BD67A2E26}" type="datetime1">
               <a:rPr lang="en-US" smtClean="0"/>
-              <a:t>10/18/2015</a:t>
+              <a:t>10/20/2015</a:t>
             </a:fld>
             <a:endParaRPr lang="en-US" dirty="0"/>
           </a:p>
@@ -31026,7 +31090,7 @@
           <a:p>
             <a:fld id="{216C5678-EE20-4FA5-88E2-6E0BD67A2E26}" type="datetime1">
               <a:rPr lang="en-US" smtClean="0"/>
-              <a:t>10/18/2015</a:t>
+              <a:t>10/20/2015</a:t>
             </a:fld>
             <a:endParaRPr lang="en-US" dirty="0"/>
           </a:p>
@@ -31408,29 +31472,7 @@
                           <a:ea typeface="Verdana" panose="020B0604030504040204" pitchFamily="34" charset="0"/>
                           <a:cs typeface="Verdana" panose="020B0604030504040204" pitchFamily="34" charset="0"/>
                         </a:rPr>
-                        <a:t> de una lista de ítems </a:t>
-                      </a:r>
-                      <a:r>
-                        <a:rPr lang="es-MX" sz="1300" kern="1200" baseline="0" dirty="0" smtClean="0">
-                          <a:solidFill>
-                            <a:schemeClr val="dk1"/>
-                          </a:solidFill>
-                          <a:latin typeface="+mj-lt"/>
-                          <a:ea typeface="Verdana" panose="020B0604030504040204" pitchFamily="34" charset="0"/>
-                          <a:cs typeface="Verdana" panose="020B0604030504040204" pitchFamily="34" charset="0"/>
-                        </a:rPr>
-                        <a:t>que se han revisado formalmente. </a:t>
-                      </a:r>
-                      <a:r>
-                        <a:rPr lang="es-MX" sz="1300" kern="1200" baseline="0" dirty="0" smtClean="0">
-                          <a:solidFill>
-                            <a:schemeClr val="dk1"/>
-                          </a:solidFill>
-                          <a:latin typeface="+mj-lt"/>
-                          <a:ea typeface="Verdana" panose="020B0604030504040204" pitchFamily="34" charset="0"/>
-                          <a:cs typeface="Verdana" panose="020B0604030504040204" pitchFamily="34" charset="0"/>
-                        </a:rPr>
-                        <a:t>Se obtiene al final de cada una de las fases, luego de haber sido aprobados y aceptados. Los </a:t>
+                        <a:t> de una lista de ítems que se han revisado formalmente. Se obtiene al final de cada una de las fases, luego de haber sido aprobados y aceptados. Los </a:t>
                       </a:r>
                       <a:r>
                         <a:rPr lang="es-MX" sz="1300" kern="1200" baseline="0" dirty="0" err="1" smtClean="0">
@@ -31452,18 +31494,7 @@
                           <a:ea typeface="Verdana" panose="020B0604030504040204" pitchFamily="34" charset="0"/>
                           <a:cs typeface="Verdana" panose="020B0604030504040204" pitchFamily="34" charset="0"/>
                         </a:rPr>
-                        <a:t> </a:t>
-                      </a:r>
-                      <a:r>
-                        <a:rPr lang="es-MX" sz="1300" kern="1200" baseline="0" dirty="0" smtClean="0">
-                          <a:solidFill>
-                            <a:schemeClr val="dk1"/>
-                          </a:solidFill>
-                          <a:latin typeface="+mj-lt"/>
-                          <a:ea typeface="Verdana" panose="020B0604030504040204" pitchFamily="34" charset="0"/>
-                          <a:cs typeface="Verdana" panose="020B0604030504040204" pitchFamily="34" charset="0"/>
-                        </a:rPr>
-                        <a:t>posteriormente sirven como base para el desarrollo posterior del proyecto</a:t>
+                        <a:t> posteriormente sirven como base para el desarrollo posterior del proyecto</a:t>
                       </a:r>
                       <a:endParaRPr lang="es-ES" sz="1300" kern="1200" dirty="0" smtClean="0">
                         <a:solidFill>
@@ -31714,18 +31745,7 @@
                           <a:ea typeface="Verdana" panose="020B0604030504040204" pitchFamily="34" charset="0"/>
                           <a:cs typeface="Verdana" panose="020B0604030504040204" pitchFamily="34" charset="0"/>
                         </a:rPr>
-                        <a:t> una línea base. Su agrupamiento provee facilidad de identificación y acceso controlado</a:t>
-                      </a:r>
-                      <a:r>
-                        <a:rPr lang="es-PE" sz="1300" kern="1200" baseline="0" dirty="0" smtClean="0">
-                          <a:solidFill>
-                            <a:schemeClr val="dk1"/>
-                          </a:solidFill>
-                          <a:latin typeface="+mj-lt"/>
-                          <a:ea typeface="Verdana" panose="020B0604030504040204" pitchFamily="34" charset="0"/>
-                          <a:cs typeface="Verdana" panose="020B0604030504040204" pitchFamily="34" charset="0"/>
-                        </a:rPr>
-                        <a:t>.</a:t>
+                        <a:t> una línea base. Su agrupamiento provee facilidad de identificación y acceso controlado.</a:t>
                       </a:r>
                       <a:endParaRPr lang="es-ES" sz="1300" b="1" kern="1200" dirty="0" smtClean="0">
                         <a:solidFill>
@@ -31932,18 +31952,7 @@
                           <a:ea typeface="Verdana" panose="020B0604030504040204" pitchFamily="34" charset="0"/>
                           <a:cs typeface="Verdana" panose="020B0604030504040204" pitchFamily="34" charset="0"/>
                         </a:rPr>
-                        <a:t>Software de </a:t>
-                      </a:r>
-                      <a:r>
-                        <a:rPr lang="es-ES" sz="1300" b="1" kern="1200" dirty="0" smtClean="0">
-                          <a:solidFill>
-                            <a:schemeClr val="dk1"/>
-                          </a:solidFill>
-                          <a:latin typeface="+mj-lt"/>
-                          <a:ea typeface="Verdana" panose="020B0604030504040204" pitchFamily="34" charset="0"/>
-                          <a:cs typeface="Verdana" panose="020B0604030504040204" pitchFamily="34" charset="0"/>
-                        </a:rPr>
-                        <a:t>Gestión de la Configuración</a:t>
+                        <a:t>Software de Gestión de la Configuración</a:t>
                       </a:r>
                     </a:p>
                   </a:txBody>
@@ -32295,18 +32304,7 @@
                           <a:ea typeface="Verdana" panose="020B0604030504040204" pitchFamily="34" charset="0"/>
                           <a:cs typeface="Verdana" panose="020B0604030504040204" pitchFamily="34" charset="0"/>
                         </a:rPr>
-                        <a:t> la evolución del proyecto, cubriendo aspectos operacionales como: Identificación del producto y sus componentes, Control de la publicación del producto, Seguimiento de estado del producto, Auditoria y revisión del </a:t>
-                      </a:r>
-                      <a:r>
-                        <a:rPr lang="es-PE" sz="1300" kern="1200" baseline="0" dirty="0" smtClean="0">
-                          <a:solidFill>
-                            <a:schemeClr val="dk1"/>
-                          </a:solidFill>
-                          <a:latin typeface="+mj-lt"/>
-                          <a:ea typeface="Verdana" panose="020B0604030504040204" pitchFamily="34" charset="0"/>
-                          <a:cs typeface="Verdana" panose="020B0604030504040204" pitchFamily="34" charset="0"/>
-                        </a:rPr>
-                        <a:t>mismo.</a:t>
+                        <a:t> la evolución del proyecto, cubriendo aspectos operacionales como: Identificación del producto y sus componentes, Control de la publicación del producto, Seguimiento de estado del producto, Auditoria y revisión del mismo.</a:t>
                       </a:r>
                       <a:endParaRPr lang="es-ES" sz="1300" kern="1200" dirty="0" smtClean="0">
                         <a:solidFill>
@@ -32347,7 +32345,7 @@
           <a:p>
             <a:fld id="{216C5678-EE20-4FA5-88E2-6E0BD67A2E26}" type="datetime1">
               <a:rPr lang="en-US" smtClean="0"/>
-              <a:t>10/18/2015</a:t>
+              <a:t>10/20/2015</a:t>
             </a:fld>
             <a:endParaRPr lang="en-US" dirty="0"/>
           </a:p>
@@ -32538,7 +32536,7 @@
           <a:p>
             <a:fld id="{216C5678-EE20-4FA5-88E2-6E0BD67A2E26}" type="datetime1">
               <a:rPr lang="en-US" smtClean="0"/>
-              <a:t>10/18/2015</a:t>
+              <a:t>10/20/2015</a:t>
             </a:fld>
             <a:endParaRPr lang="en-US" dirty="0"/>
           </a:p>
@@ -32738,7 +32736,7 @@
           <a:p>
             <a:fld id="{216C5678-EE20-4FA5-88E2-6E0BD67A2E26}" type="datetime1">
               <a:rPr lang="en-US" smtClean="0"/>
-              <a:t>10/18/2015</a:t>
+              <a:t>10/20/2015</a:t>
             </a:fld>
             <a:endParaRPr lang="en-US" dirty="0"/>
           </a:p>

</xml_diff>

<commit_message>
Plan Gestión de Configuración
</commit_message>
<xml_diff>
--- a/Area_de_Proceso-CM/PGC/PGC_V1.0_2015.pptx
+++ b/Area_de_Proceso-CM/PGC/PGC_V1.0_2015.pptx
@@ -1923,1046 +1923,6 @@
       <dsp:cNvGrpSpPr/>
     </dsp:nvGrpSpPr>
     <dsp:grpSpPr/>
-    <dsp:sp modelId="{55A4A5BB-6FD8-475A-835C-B4EB380A1BDF}">
-      <dsp:nvSpPr>
-        <dsp:cNvPr id="0" name=""/>
-        <dsp:cNvSpPr/>
-      </dsp:nvSpPr>
-      <dsp:spPr>
-        <a:xfrm rot="5400000">
-          <a:off x="4334260" y="-2503761"/>
-          <a:ext cx="1666061" cy="6941853"/>
-        </a:xfrm>
-        <a:prstGeom prst="round2SameRect">
-          <a:avLst/>
-        </a:prstGeom>
-        <a:solidFill>
-          <a:schemeClr val="dk2">
-            <a:alpha val="90000"/>
-            <a:tint val="40000"/>
-            <a:hueOff val="0"/>
-            <a:satOff val="0"/>
-            <a:lumOff val="0"/>
-            <a:alphaOff val="0"/>
-          </a:schemeClr>
-        </a:solidFill>
-        <a:ln w="28575" cap="flat" cmpd="sng" algn="ctr">
-          <a:solidFill>
-            <a:schemeClr val="dk2">
-              <a:alpha val="90000"/>
-              <a:tint val="40000"/>
-              <a:hueOff val="0"/>
-              <a:satOff val="0"/>
-              <a:lumOff val="0"/>
-              <a:alphaOff val="0"/>
-            </a:schemeClr>
-          </a:solidFill>
-          <a:prstDash val="solid"/>
-        </a:ln>
-        <a:effectLst/>
-      </dsp:spPr>
-      <dsp:style>
-        <a:lnRef idx="2">
-          <a:scrgbClr r="0" g="0" b="0"/>
-        </a:lnRef>
-        <a:fillRef idx="1">
-          <a:scrgbClr r="0" g="0" b="0"/>
-        </a:fillRef>
-        <a:effectRef idx="0">
-          <a:scrgbClr r="0" g="0" b="0"/>
-        </a:effectRef>
-        <a:fontRef idx="minor"/>
-      </dsp:style>
-      <dsp:txBody>
-        <a:bodyPr spcFirstLastPara="0" vert="horz" wrap="square" lIns="247650" tIns="123825" rIns="247650" bIns="123825" numCol="1" spcCol="1270" anchor="ctr" anchorCtr="0">
-          <a:noAutofit/>
-        </a:bodyPr>
-        <a:lstStyle/>
-        <a:p>
-          <a:pPr marL="114300" lvl="1" indent="-114300" algn="just" defTabSz="577850">
-            <a:lnSpc>
-              <a:spcPct val="90000"/>
-            </a:lnSpc>
-            <a:spcBef>
-              <a:spcPct val="0"/>
-            </a:spcBef>
-            <a:spcAft>
-              <a:spcPct val="15000"/>
-            </a:spcAft>
-            <a:buChar char="••"/>
-          </a:pPr>
-          <a:r>
-            <a:rPr lang="es-ES" altLang="es-PE" sz="1300" kern="1200" dirty="0" smtClean="0">
-              <a:solidFill>
-                <a:schemeClr val="tx1"/>
-              </a:solidFill>
-              <a:latin typeface="+mj-lt"/>
-            </a:rPr>
-            <a:t>Define, diseña y administra el proceso de Gestión de la configuración.</a:t>
-          </a:r>
-          <a:endParaRPr lang="es-PE" sz="1300" kern="1200" dirty="0">
-            <a:solidFill>
-              <a:schemeClr val="tx1"/>
-            </a:solidFill>
-            <a:latin typeface="+mj-lt"/>
-          </a:endParaRPr>
-        </a:p>
-        <a:p>
-          <a:pPr marL="114300" lvl="1" indent="-114300" algn="just" defTabSz="577850">
-            <a:lnSpc>
-              <a:spcPct val="90000"/>
-            </a:lnSpc>
-            <a:spcBef>
-              <a:spcPct val="0"/>
-            </a:spcBef>
-            <a:spcAft>
-              <a:spcPct val="15000"/>
-            </a:spcAft>
-            <a:buChar char="••"/>
-          </a:pPr>
-          <a:r>
-            <a:rPr lang="es-ES" altLang="es-PE" sz="1300" kern="1200" dirty="0" smtClean="0">
-              <a:solidFill>
-                <a:schemeClr val="tx1"/>
-              </a:solidFill>
-              <a:latin typeface="+mj-lt"/>
-            </a:rPr>
-            <a:t>Realiza el seguimiento de las tareas detalladas en el Plan de Proyecto.</a:t>
-          </a:r>
-          <a:endParaRPr lang="es-ES" altLang="es-PE" sz="1300" kern="1200" dirty="0">
-            <a:solidFill>
-              <a:schemeClr val="tx1"/>
-            </a:solidFill>
-            <a:latin typeface="+mj-lt"/>
-          </a:endParaRPr>
-        </a:p>
-        <a:p>
-          <a:pPr marL="114300" lvl="1" indent="-114300" algn="just" defTabSz="577850">
-            <a:lnSpc>
-              <a:spcPct val="90000"/>
-            </a:lnSpc>
-            <a:spcBef>
-              <a:spcPct val="0"/>
-            </a:spcBef>
-            <a:spcAft>
-              <a:spcPct val="15000"/>
-            </a:spcAft>
-            <a:buChar char="••"/>
-          </a:pPr>
-          <a:r>
-            <a:rPr lang="es-ES" altLang="es-PE" sz="1300" kern="1200" dirty="0" smtClean="0">
-              <a:solidFill>
-                <a:schemeClr val="tx1"/>
-              </a:solidFill>
-              <a:latin typeface="+mj-lt"/>
-            </a:rPr>
-            <a:t>Mantiene y preserva los </a:t>
-          </a:r>
-          <a:r>
-            <a:rPr lang="es-ES" altLang="es-PE" sz="1300" kern="1200" dirty="0" err="1" smtClean="0">
-              <a:solidFill>
-                <a:schemeClr val="tx1"/>
-              </a:solidFill>
-              <a:latin typeface="+mj-lt"/>
-            </a:rPr>
-            <a:t>Baselines</a:t>
-          </a:r>
-          <a:r>
-            <a:rPr lang="es-ES" altLang="es-PE" sz="1300" kern="1200" dirty="0" smtClean="0">
-              <a:solidFill>
-                <a:schemeClr val="tx1"/>
-              </a:solidFill>
-              <a:latin typeface="+mj-lt"/>
-            </a:rPr>
-            <a:t>.</a:t>
-          </a:r>
-          <a:endParaRPr lang="es-ES" altLang="es-PE" sz="1300" kern="1200" dirty="0">
-            <a:solidFill>
-              <a:schemeClr val="tx1"/>
-            </a:solidFill>
-            <a:latin typeface="+mj-lt"/>
-          </a:endParaRPr>
-        </a:p>
-        <a:p>
-          <a:pPr marL="114300" lvl="1" indent="-114300" algn="just" defTabSz="577850">
-            <a:lnSpc>
-              <a:spcPct val="90000"/>
-            </a:lnSpc>
-            <a:spcBef>
-              <a:spcPct val="0"/>
-            </a:spcBef>
-            <a:spcAft>
-              <a:spcPct val="15000"/>
-            </a:spcAft>
-            <a:buChar char="••"/>
-          </a:pPr>
-          <a:r>
-            <a:rPr lang="es-ES" altLang="es-PE" sz="1300" kern="1200" dirty="0" smtClean="0">
-              <a:solidFill>
-                <a:schemeClr val="tx1"/>
-              </a:solidFill>
-              <a:latin typeface="+mj-lt"/>
-            </a:rPr>
-            <a:t>Asegura y garantiza la disponibilidad de la información almacenada en el repositorio.</a:t>
-          </a:r>
-          <a:endParaRPr lang="es-ES" altLang="es-PE" sz="1300" kern="1200" dirty="0">
-            <a:solidFill>
-              <a:schemeClr val="tx1"/>
-            </a:solidFill>
-            <a:latin typeface="+mj-lt"/>
-          </a:endParaRPr>
-        </a:p>
-        <a:p>
-          <a:pPr marL="114300" lvl="1" indent="-114300" algn="just" defTabSz="577850">
-            <a:lnSpc>
-              <a:spcPct val="90000"/>
-            </a:lnSpc>
-            <a:spcBef>
-              <a:spcPct val="0"/>
-            </a:spcBef>
-            <a:spcAft>
-              <a:spcPct val="15000"/>
-            </a:spcAft>
-            <a:buChar char="••"/>
-          </a:pPr>
-          <a:r>
-            <a:rPr lang="es-ES" altLang="es-PE" sz="1300" kern="1200" dirty="0" smtClean="0">
-              <a:solidFill>
-                <a:schemeClr val="tx1"/>
-              </a:solidFill>
-              <a:latin typeface="+mj-lt"/>
-            </a:rPr>
-            <a:t>Encargado de actividades de versionamiento de los documentos a su cargo, de acuerdo a los estándares establecidos.</a:t>
-          </a:r>
-          <a:endParaRPr lang="es-ES" altLang="es-PE" sz="1300" kern="1200" dirty="0">
-            <a:solidFill>
-              <a:schemeClr val="tx1"/>
-            </a:solidFill>
-            <a:latin typeface="+mj-lt"/>
-          </a:endParaRPr>
-        </a:p>
-      </dsp:txBody>
-      <dsp:txXfrm rot="-5400000">
-        <a:off x="1696364" y="215465"/>
-        <a:ext cx="6860523" cy="1503401"/>
-      </dsp:txXfrm>
-    </dsp:sp>
-    <dsp:sp modelId="{8CC325B9-FE1B-4789-9E50-400E884AD525}">
-      <dsp:nvSpPr>
-        <dsp:cNvPr id="0" name=""/>
-        <dsp:cNvSpPr/>
-      </dsp:nvSpPr>
-      <dsp:spPr>
-        <a:xfrm>
-          <a:off x="765" y="1638"/>
-          <a:ext cx="1695599" cy="1931051"/>
-        </a:xfrm>
-        <a:prstGeom prst="roundRect">
-          <a:avLst/>
-        </a:prstGeom>
-        <a:solidFill>
-          <a:schemeClr val="dk2">
-            <a:hueOff val="0"/>
-            <a:satOff val="0"/>
-            <a:lumOff val="0"/>
-            <a:alphaOff val="0"/>
-          </a:schemeClr>
-        </a:solidFill>
-        <a:ln w="28575" cap="flat" cmpd="sng" algn="ctr">
-          <a:solidFill>
-            <a:schemeClr val="lt2">
-              <a:hueOff val="0"/>
-              <a:satOff val="0"/>
-              <a:lumOff val="0"/>
-              <a:alphaOff val="0"/>
-            </a:schemeClr>
-          </a:solidFill>
-          <a:prstDash val="solid"/>
-        </a:ln>
-        <a:effectLst/>
-      </dsp:spPr>
-      <dsp:style>
-        <a:lnRef idx="2">
-          <a:scrgbClr r="0" g="0" b="0"/>
-        </a:lnRef>
-        <a:fillRef idx="1">
-          <a:scrgbClr r="0" g="0" b="0"/>
-        </a:fillRef>
-        <a:effectRef idx="0">
-          <a:scrgbClr r="0" g="0" b="0"/>
-        </a:effectRef>
-        <a:fontRef idx="minor">
-          <a:schemeClr val="lt1"/>
-        </a:fontRef>
-      </dsp:style>
-      <dsp:txBody>
-        <a:bodyPr spcFirstLastPara="0" vert="horz" wrap="square" lIns="60960" tIns="30480" rIns="60960" bIns="30480" numCol="1" spcCol="1270" anchor="ctr" anchorCtr="0">
-          <a:noAutofit/>
-        </a:bodyPr>
-        <a:lstStyle/>
-        <a:p>
-          <a:pPr lvl="0" algn="ctr" defTabSz="711200">
-            <a:lnSpc>
-              <a:spcPct val="90000"/>
-            </a:lnSpc>
-            <a:spcBef>
-              <a:spcPct val="0"/>
-            </a:spcBef>
-            <a:spcAft>
-              <a:spcPct val="35000"/>
-            </a:spcAft>
-          </a:pPr>
-          <a:r>
-            <a:rPr lang="es-ES" sz="1600" b="1" kern="1200" dirty="0" smtClean="0">
-              <a:effectLst>
-                <a:outerShdw blurRad="38100" dist="38100" dir="2700000" algn="tl">
-                  <a:srgbClr val="000000">
-                    <a:alpha val="43137"/>
-                  </a:srgbClr>
-                </a:outerShdw>
-              </a:effectLst>
-            </a:rPr>
-            <a:t>Gestor de la Configuración</a:t>
-          </a:r>
-        </a:p>
-        <a:p>
-          <a:pPr lvl="0" algn="ctr" defTabSz="711200">
-            <a:lnSpc>
-              <a:spcPct val="90000"/>
-            </a:lnSpc>
-            <a:spcBef>
-              <a:spcPct val="0"/>
-            </a:spcBef>
-            <a:spcAft>
-              <a:spcPct val="35000"/>
-            </a:spcAft>
-          </a:pPr>
-          <a:endParaRPr lang="es-ES" sz="1600" b="1" kern="1200" dirty="0" smtClean="0">
-            <a:effectLst>
-              <a:outerShdw blurRad="38100" dist="38100" dir="2700000" algn="tl">
-                <a:srgbClr val="000000">
-                  <a:alpha val="43137"/>
-                </a:srgbClr>
-              </a:outerShdw>
-            </a:effectLst>
-          </a:endParaRPr>
-        </a:p>
-        <a:p>
-          <a:pPr lvl="0" algn="ctr" defTabSz="711200">
-            <a:lnSpc>
-              <a:spcPct val="90000"/>
-            </a:lnSpc>
-            <a:spcBef>
-              <a:spcPct val="0"/>
-            </a:spcBef>
-            <a:spcAft>
-              <a:spcPct val="35000"/>
-            </a:spcAft>
-          </a:pPr>
-          <a:r>
-            <a:rPr lang="es-ES" sz="1600" b="1" kern="1200" dirty="0" smtClean="0">
-              <a:effectLst>
-                <a:outerShdw blurRad="38100" dist="38100" dir="2700000" algn="tl">
-                  <a:srgbClr val="000000">
-                    <a:alpha val="43137"/>
-                  </a:srgbClr>
-                </a:outerShdw>
-              </a:effectLst>
-            </a:rPr>
-            <a:t>EJR-SOFT</a:t>
-          </a:r>
-          <a:endParaRPr lang="es-PE" sz="1600" b="1" kern="1200" dirty="0">
-            <a:effectLst>
-              <a:outerShdw blurRad="38100" dist="38100" dir="2700000" algn="tl">
-                <a:srgbClr val="000000">
-                  <a:alpha val="43137"/>
-                </a:srgbClr>
-              </a:outerShdw>
-            </a:effectLst>
-          </a:endParaRPr>
-        </a:p>
-      </dsp:txBody>
-      <dsp:txXfrm>
-        <a:off x="83537" y="84410"/>
-        <a:ext cx="1530055" cy="1765507"/>
-      </dsp:txXfrm>
-    </dsp:sp>
-    <dsp:sp modelId="{90FF61B1-8C9B-462F-B4E1-EA95A07D6F86}">
-      <dsp:nvSpPr>
-        <dsp:cNvPr id="0" name=""/>
-        <dsp:cNvSpPr/>
-      </dsp:nvSpPr>
-      <dsp:spPr>
-        <a:xfrm rot="5400000">
-          <a:off x="4490622" y="-604732"/>
-          <a:ext cx="1355310" cy="6943833"/>
-        </a:xfrm>
-        <a:prstGeom prst="round2SameRect">
-          <a:avLst/>
-        </a:prstGeom>
-        <a:solidFill>
-          <a:schemeClr val="dk2">
-            <a:alpha val="90000"/>
-            <a:tint val="40000"/>
-            <a:hueOff val="0"/>
-            <a:satOff val="0"/>
-            <a:lumOff val="0"/>
-            <a:alphaOff val="0"/>
-          </a:schemeClr>
-        </a:solidFill>
-        <a:ln w="28575" cap="flat" cmpd="sng" algn="ctr">
-          <a:solidFill>
-            <a:schemeClr val="dk2">
-              <a:alpha val="90000"/>
-              <a:tint val="40000"/>
-              <a:hueOff val="0"/>
-              <a:satOff val="0"/>
-              <a:lumOff val="0"/>
-              <a:alphaOff val="0"/>
-            </a:schemeClr>
-          </a:solidFill>
-          <a:prstDash val="solid"/>
-        </a:ln>
-        <a:effectLst/>
-      </dsp:spPr>
-      <dsp:style>
-        <a:lnRef idx="2">
-          <a:scrgbClr r="0" g="0" b="0"/>
-        </a:lnRef>
-        <a:fillRef idx="1">
-          <a:scrgbClr r="0" g="0" b="0"/>
-        </a:fillRef>
-        <a:effectRef idx="0">
-          <a:scrgbClr r="0" g="0" b="0"/>
-        </a:effectRef>
-        <a:fontRef idx="minor"/>
-      </dsp:style>
-      <dsp:txBody>
-        <a:bodyPr spcFirstLastPara="0" vert="horz" wrap="square" lIns="247650" tIns="123825" rIns="247650" bIns="123825" numCol="1" spcCol="1270" anchor="ctr" anchorCtr="0">
-          <a:noAutofit/>
-        </a:bodyPr>
-        <a:lstStyle/>
-        <a:p>
-          <a:pPr marL="0" lvl="1" indent="0" algn="just" defTabSz="577850">
-            <a:lnSpc>
-              <a:spcPct val="90000"/>
-            </a:lnSpc>
-            <a:spcBef>
-              <a:spcPct val="0"/>
-            </a:spcBef>
-            <a:spcAft>
-              <a:spcPct val="15000"/>
-            </a:spcAft>
-            <a:buChar char="••"/>
-          </a:pPr>
-          <a:r>
-            <a:rPr lang="es-MX" sz="1300" kern="1200" dirty="0" smtClean="0">
-              <a:solidFill>
-                <a:schemeClr val="tx1"/>
-              </a:solidFill>
-              <a:latin typeface="+mj-lt"/>
-            </a:rPr>
-            <a:t>Encargado de las actividades de versionamiento de los documentos de análisis, diseño y control interno (cronogramas y actas de reunión), de acuerdo a los estándares establecidos.</a:t>
-          </a:r>
-          <a:endParaRPr lang="es-PE" sz="1300" kern="1200" dirty="0">
-            <a:solidFill>
-              <a:schemeClr val="tx1"/>
-            </a:solidFill>
-            <a:latin typeface="+mj-lt"/>
-          </a:endParaRPr>
-        </a:p>
-        <a:p>
-          <a:pPr marL="0" lvl="1" indent="0" algn="just" defTabSz="577850">
-            <a:lnSpc>
-              <a:spcPct val="90000"/>
-            </a:lnSpc>
-            <a:spcBef>
-              <a:spcPct val="0"/>
-            </a:spcBef>
-            <a:spcAft>
-              <a:spcPct val="15000"/>
-            </a:spcAft>
-            <a:buChar char="••"/>
-          </a:pPr>
-          <a:r>
-            <a:rPr lang="es-MX" sz="1300" kern="1200" dirty="0" smtClean="0">
-              <a:solidFill>
-                <a:schemeClr val="tx1"/>
-              </a:solidFill>
-              <a:latin typeface="+mj-lt"/>
-            </a:rPr>
-            <a:t>Revisará que se mantenga los estándares de nomenclatura y versionamiento de los entregables.</a:t>
-          </a:r>
-          <a:endParaRPr lang="es-PE" sz="1300" kern="1200" dirty="0">
-            <a:solidFill>
-              <a:schemeClr val="tx1"/>
-            </a:solidFill>
-            <a:latin typeface="+mj-lt"/>
-          </a:endParaRPr>
-        </a:p>
-        <a:p>
-          <a:pPr marL="0" lvl="1" indent="0" algn="just" defTabSz="577850">
-            <a:lnSpc>
-              <a:spcPct val="90000"/>
-            </a:lnSpc>
-            <a:spcBef>
-              <a:spcPct val="0"/>
-            </a:spcBef>
-            <a:spcAft>
-              <a:spcPct val="15000"/>
-            </a:spcAft>
-            <a:buChar char="••"/>
-          </a:pPr>
-          <a:r>
-            <a:rPr lang="es-ES" altLang="es-PE" sz="1300" kern="1200" dirty="0" smtClean="0">
-              <a:solidFill>
-                <a:schemeClr val="tx1"/>
-              </a:solidFill>
-              <a:latin typeface="+mj-lt"/>
-            </a:rPr>
-            <a:t>Garantiza la sostenibilidad del proceso de gestión de la configuración</a:t>
-          </a:r>
-          <a:endParaRPr lang="es-PE" sz="1300" kern="1200" dirty="0">
-            <a:solidFill>
-              <a:schemeClr val="tx1"/>
-            </a:solidFill>
-            <a:latin typeface="+mj-lt"/>
-          </a:endParaRPr>
-        </a:p>
-      </dsp:txBody>
-      <dsp:txXfrm rot="-5400000">
-        <a:off x="1696361" y="2255690"/>
-        <a:ext cx="6877672" cy="1222988"/>
-      </dsp:txXfrm>
-    </dsp:sp>
-    <dsp:sp modelId="{26EEAA25-729A-4075-87DC-0DA13F9B7FA1}">
-      <dsp:nvSpPr>
-        <dsp:cNvPr id="0" name=""/>
-        <dsp:cNvSpPr/>
-      </dsp:nvSpPr>
-      <dsp:spPr>
-        <a:xfrm>
-          <a:off x="765" y="2063135"/>
-          <a:ext cx="1695596" cy="1608096"/>
-        </a:xfrm>
-        <a:prstGeom prst="roundRect">
-          <a:avLst/>
-        </a:prstGeom>
-        <a:solidFill>
-          <a:schemeClr val="dk2">
-            <a:hueOff val="0"/>
-            <a:satOff val="0"/>
-            <a:lumOff val="0"/>
-            <a:alphaOff val="0"/>
-          </a:schemeClr>
-        </a:solidFill>
-        <a:ln w="28575" cap="flat" cmpd="sng" algn="ctr">
-          <a:solidFill>
-            <a:schemeClr val="lt2">
-              <a:hueOff val="0"/>
-              <a:satOff val="0"/>
-              <a:lumOff val="0"/>
-              <a:alphaOff val="0"/>
-            </a:schemeClr>
-          </a:solidFill>
-          <a:prstDash val="solid"/>
-        </a:ln>
-        <a:effectLst/>
-      </dsp:spPr>
-      <dsp:style>
-        <a:lnRef idx="2">
-          <a:scrgbClr r="0" g="0" b="0"/>
-        </a:lnRef>
-        <a:fillRef idx="1">
-          <a:scrgbClr r="0" g="0" b="0"/>
-        </a:fillRef>
-        <a:effectRef idx="0">
-          <a:scrgbClr r="0" g="0" b="0"/>
-        </a:effectRef>
-        <a:fontRef idx="minor">
-          <a:schemeClr val="lt1"/>
-        </a:fontRef>
-      </dsp:style>
-      <dsp:txBody>
-        <a:bodyPr spcFirstLastPara="0" vert="horz" wrap="square" lIns="60960" tIns="30480" rIns="60960" bIns="30480" numCol="1" spcCol="1270" anchor="ctr" anchorCtr="0">
-          <a:noAutofit/>
-        </a:bodyPr>
-        <a:lstStyle/>
-        <a:p>
-          <a:pPr lvl="0" algn="ctr" defTabSz="711200">
-            <a:lnSpc>
-              <a:spcPct val="90000"/>
-            </a:lnSpc>
-            <a:spcBef>
-              <a:spcPct val="0"/>
-            </a:spcBef>
-            <a:spcAft>
-              <a:spcPct val="35000"/>
-            </a:spcAft>
-          </a:pPr>
-          <a:r>
-            <a:rPr lang="es-ES" sz="1600" b="1" kern="1200" dirty="0" smtClean="0">
-              <a:effectLst>
-                <a:outerShdw blurRad="38100" dist="38100" dir="2700000" algn="tl">
-                  <a:srgbClr val="000000">
-                    <a:alpha val="43137"/>
-                  </a:srgbClr>
-                </a:outerShdw>
-              </a:effectLst>
-            </a:rPr>
-            <a:t>Jefe de Proyecto</a:t>
-          </a:r>
-        </a:p>
-        <a:p>
-          <a:pPr lvl="0" algn="ctr" defTabSz="711200">
-            <a:lnSpc>
-              <a:spcPct val="90000"/>
-            </a:lnSpc>
-            <a:spcBef>
-              <a:spcPct val="0"/>
-            </a:spcBef>
-            <a:spcAft>
-              <a:spcPct val="35000"/>
-            </a:spcAft>
-          </a:pPr>
-          <a:r>
-            <a:rPr lang="es-ES" sz="1600" b="1" kern="1200" dirty="0" smtClean="0">
-              <a:effectLst>
-                <a:outerShdw blurRad="38100" dist="38100" dir="2700000" algn="tl">
-                  <a:srgbClr val="000000">
-                    <a:alpha val="43137"/>
-                  </a:srgbClr>
-                </a:outerShdw>
-              </a:effectLst>
-            </a:rPr>
-            <a:t>EJR-SOFT</a:t>
-          </a:r>
-          <a:endParaRPr lang="es-PE" sz="1600" b="1" kern="1200" dirty="0">
-            <a:effectLst>
-              <a:outerShdw blurRad="38100" dist="38100" dir="2700000" algn="tl">
-                <a:srgbClr val="000000">
-                  <a:alpha val="43137"/>
-                </a:srgbClr>
-              </a:outerShdw>
-            </a:effectLst>
-          </a:endParaRPr>
-        </a:p>
-      </dsp:txBody>
-      <dsp:txXfrm>
-        <a:off x="79266" y="2141636"/>
-        <a:ext cx="1538594" cy="1451094"/>
-      </dsp:txXfrm>
-    </dsp:sp>
-    <dsp:sp modelId="{606E3E56-5C5B-4E6D-B3B5-731FAFDC0CDE}">
-      <dsp:nvSpPr>
-        <dsp:cNvPr id="0" name=""/>
-        <dsp:cNvSpPr/>
-      </dsp:nvSpPr>
-      <dsp:spPr>
-        <a:xfrm rot="5400000">
-          <a:off x="4787161" y="838042"/>
-          <a:ext cx="758290" cy="6939885"/>
-        </a:xfrm>
-        <a:prstGeom prst="round2SameRect">
-          <a:avLst/>
-        </a:prstGeom>
-        <a:solidFill>
-          <a:schemeClr val="dk2">
-            <a:alpha val="90000"/>
-            <a:tint val="40000"/>
-            <a:hueOff val="0"/>
-            <a:satOff val="0"/>
-            <a:lumOff val="0"/>
-            <a:alphaOff val="0"/>
-          </a:schemeClr>
-        </a:solidFill>
-        <a:ln w="28575" cap="flat" cmpd="sng" algn="ctr">
-          <a:solidFill>
-            <a:schemeClr val="dk2">
-              <a:alpha val="90000"/>
-              <a:tint val="40000"/>
-              <a:hueOff val="0"/>
-              <a:satOff val="0"/>
-              <a:lumOff val="0"/>
-              <a:alphaOff val="0"/>
-            </a:schemeClr>
-          </a:solidFill>
-          <a:prstDash val="solid"/>
-        </a:ln>
-        <a:effectLst/>
-      </dsp:spPr>
-      <dsp:style>
-        <a:lnRef idx="2">
-          <a:scrgbClr r="0" g="0" b="0"/>
-        </a:lnRef>
-        <a:fillRef idx="1">
-          <a:scrgbClr r="0" g="0" b="0"/>
-        </a:fillRef>
-        <a:effectRef idx="0">
-          <a:scrgbClr r="0" g="0" b="0"/>
-        </a:effectRef>
-        <a:fontRef idx="minor"/>
-      </dsp:style>
-      <dsp:txBody>
-        <a:bodyPr spcFirstLastPara="0" vert="horz" wrap="square" lIns="247650" tIns="123825" rIns="247650" bIns="123825" numCol="1" spcCol="1270" anchor="ctr" anchorCtr="0">
-          <a:noAutofit/>
-        </a:bodyPr>
-        <a:lstStyle/>
-        <a:p>
-          <a:pPr marL="114300" lvl="1" indent="-114300" algn="l" defTabSz="577850">
-            <a:lnSpc>
-              <a:spcPct val="90000"/>
-            </a:lnSpc>
-            <a:spcBef>
-              <a:spcPct val="0"/>
-            </a:spcBef>
-            <a:spcAft>
-              <a:spcPct val="15000"/>
-            </a:spcAft>
-            <a:buChar char="••"/>
-          </a:pPr>
-          <a:r>
-            <a:rPr lang="es-PE" sz="1300" kern="1200" dirty="0" smtClean="0">
-              <a:solidFill>
-                <a:schemeClr val="tx1"/>
-              </a:solidFill>
-              <a:latin typeface="+mj-lt"/>
-            </a:rPr>
-            <a:t>Encargado de las actividades de versionamiento y revisión de los documento, de acuerdo a los procedimientos establecidos y verificando que se cumplan los estándares con los que se trabaja en el proyecto.</a:t>
-          </a:r>
-          <a:endParaRPr lang="es-PE" sz="1300" kern="1200" dirty="0">
-            <a:solidFill>
-              <a:schemeClr val="tx1"/>
-            </a:solidFill>
-            <a:latin typeface="+mj-lt"/>
-          </a:endParaRPr>
-        </a:p>
-      </dsp:txBody>
-      <dsp:txXfrm rot="-5400000">
-        <a:off x="1696364" y="3965857"/>
-        <a:ext cx="6902868" cy="684256"/>
-      </dsp:txXfrm>
-    </dsp:sp>
-    <dsp:sp modelId="{4F1584CA-B33D-4DB0-9C34-1ECED7CFA1C5}">
-      <dsp:nvSpPr>
-        <dsp:cNvPr id="0" name=""/>
-        <dsp:cNvSpPr/>
-      </dsp:nvSpPr>
-      <dsp:spPr>
-        <a:xfrm>
-          <a:off x="0" y="3794267"/>
-          <a:ext cx="1695599" cy="1012616"/>
-        </a:xfrm>
-        <a:prstGeom prst="roundRect">
-          <a:avLst/>
-        </a:prstGeom>
-        <a:solidFill>
-          <a:schemeClr val="dk2">
-            <a:hueOff val="0"/>
-            <a:satOff val="0"/>
-            <a:lumOff val="0"/>
-            <a:alphaOff val="0"/>
-          </a:schemeClr>
-        </a:solidFill>
-        <a:ln w="28575" cap="flat" cmpd="sng" algn="ctr">
-          <a:solidFill>
-            <a:schemeClr val="lt2">
-              <a:hueOff val="0"/>
-              <a:satOff val="0"/>
-              <a:lumOff val="0"/>
-              <a:alphaOff val="0"/>
-            </a:schemeClr>
-          </a:solidFill>
-          <a:prstDash val="solid"/>
-        </a:ln>
-        <a:effectLst/>
-      </dsp:spPr>
-      <dsp:style>
-        <a:lnRef idx="2">
-          <a:scrgbClr r="0" g="0" b="0"/>
-        </a:lnRef>
-        <a:fillRef idx="1">
-          <a:scrgbClr r="0" g="0" b="0"/>
-        </a:fillRef>
-        <a:effectRef idx="0">
-          <a:scrgbClr r="0" g="0" b="0"/>
-        </a:effectRef>
-        <a:fontRef idx="minor">
-          <a:schemeClr val="lt1"/>
-        </a:fontRef>
-      </dsp:style>
-      <dsp:txBody>
-        <a:bodyPr spcFirstLastPara="0" vert="horz" wrap="square" lIns="60960" tIns="30480" rIns="60960" bIns="30480" numCol="1" spcCol="1270" anchor="ctr" anchorCtr="0">
-          <a:noAutofit/>
-        </a:bodyPr>
-        <a:lstStyle/>
-        <a:p>
-          <a:pPr lvl="0" algn="ctr" defTabSz="711200">
-            <a:lnSpc>
-              <a:spcPct val="90000"/>
-            </a:lnSpc>
-            <a:spcBef>
-              <a:spcPct val="0"/>
-            </a:spcBef>
-            <a:spcAft>
-              <a:spcPct val="35000"/>
-            </a:spcAft>
-          </a:pPr>
-          <a:r>
-            <a:rPr lang="es-ES" sz="1600" b="1" kern="1200" dirty="0" smtClean="0">
-              <a:effectLst>
-                <a:outerShdw blurRad="38100" dist="38100" dir="2700000" algn="tl">
-                  <a:srgbClr val="000000">
-                    <a:alpha val="43137"/>
-                  </a:srgbClr>
-                </a:outerShdw>
-              </a:effectLst>
-            </a:rPr>
-            <a:t>Analista de Calidad</a:t>
-          </a:r>
-        </a:p>
-        <a:p>
-          <a:pPr lvl="0" algn="ctr" defTabSz="711200">
-            <a:lnSpc>
-              <a:spcPct val="90000"/>
-            </a:lnSpc>
-            <a:spcBef>
-              <a:spcPct val="0"/>
-            </a:spcBef>
-            <a:spcAft>
-              <a:spcPct val="35000"/>
-            </a:spcAft>
-          </a:pPr>
-          <a:r>
-            <a:rPr lang="es-ES" sz="1600" b="1" kern="1200" dirty="0" smtClean="0">
-              <a:effectLst>
-                <a:outerShdw blurRad="38100" dist="38100" dir="2700000" algn="tl">
-                  <a:srgbClr val="000000">
-                    <a:alpha val="43137"/>
-                  </a:srgbClr>
-                </a:outerShdw>
-              </a:effectLst>
-            </a:rPr>
-            <a:t>EJR-SOFT</a:t>
-          </a:r>
-          <a:endParaRPr lang="es-PE" sz="1600" b="1" kern="1200" dirty="0">
-            <a:effectLst>
-              <a:outerShdw blurRad="38100" dist="38100" dir="2700000" algn="tl">
-                <a:srgbClr val="000000">
-                  <a:alpha val="43137"/>
-                </a:srgbClr>
-              </a:outerShdw>
-            </a:effectLst>
-          </a:endParaRPr>
-        </a:p>
-      </dsp:txBody>
-      <dsp:txXfrm>
-        <a:off x="49432" y="3843699"/>
-        <a:ext cx="1596735" cy="913752"/>
-      </dsp:txXfrm>
-    </dsp:sp>
-    <dsp:sp modelId="{50E57063-BAFE-4849-B27F-45AB6336F242}">
-      <dsp:nvSpPr>
-        <dsp:cNvPr id="0" name=""/>
-        <dsp:cNvSpPr/>
-      </dsp:nvSpPr>
-      <dsp:spPr>
-        <a:xfrm rot="5400000">
-          <a:off x="4717727" y="2014126"/>
-          <a:ext cx="895790" cy="6938539"/>
-        </a:xfrm>
-        <a:prstGeom prst="round2SameRect">
-          <a:avLst/>
-        </a:prstGeom>
-        <a:solidFill>
-          <a:schemeClr val="dk2">
-            <a:alpha val="90000"/>
-            <a:tint val="40000"/>
-            <a:hueOff val="0"/>
-            <a:satOff val="0"/>
-            <a:lumOff val="0"/>
-            <a:alphaOff val="0"/>
-          </a:schemeClr>
-        </a:solidFill>
-        <a:ln w="28575" cap="flat" cmpd="sng" algn="ctr">
-          <a:solidFill>
-            <a:schemeClr val="dk2">
-              <a:alpha val="90000"/>
-              <a:tint val="40000"/>
-              <a:hueOff val="0"/>
-              <a:satOff val="0"/>
-              <a:lumOff val="0"/>
-              <a:alphaOff val="0"/>
-            </a:schemeClr>
-          </a:solidFill>
-          <a:prstDash val="solid"/>
-        </a:ln>
-        <a:effectLst/>
-      </dsp:spPr>
-      <dsp:style>
-        <a:lnRef idx="2">
-          <a:scrgbClr r="0" g="0" b="0"/>
-        </a:lnRef>
-        <a:fillRef idx="1">
-          <a:scrgbClr r="0" g="0" b="0"/>
-        </a:fillRef>
-        <a:effectRef idx="0">
-          <a:scrgbClr r="0" g="0" b="0"/>
-        </a:effectRef>
-        <a:fontRef idx="minor"/>
-      </dsp:style>
-      <dsp:txBody>
-        <a:bodyPr spcFirstLastPara="0" vert="horz" wrap="square" lIns="247650" tIns="123825" rIns="247650" bIns="123825" numCol="1" spcCol="1270" anchor="ctr" anchorCtr="0">
-          <a:noAutofit/>
-        </a:bodyPr>
-        <a:lstStyle/>
-        <a:p>
-          <a:pPr marL="114300" lvl="1" indent="-114300" algn="l" defTabSz="577850">
-            <a:lnSpc>
-              <a:spcPct val="90000"/>
-            </a:lnSpc>
-            <a:spcBef>
-              <a:spcPct val="0"/>
-            </a:spcBef>
-            <a:spcAft>
-              <a:spcPct val="15000"/>
-            </a:spcAft>
-            <a:buChar char="••"/>
-          </a:pPr>
-          <a:r>
-            <a:rPr lang="es-MX" sz="1300" kern="1200" dirty="0" smtClean="0">
-              <a:latin typeface="+mj-lt"/>
-            </a:rPr>
-            <a:t>Encargado de las actividades de versionamiento de documentos de análisis, diseño y control interno de acuerdo a los estándares establecidos.</a:t>
-          </a:r>
-          <a:endParaRPr lang="es-PE" sz="1300" kern="1200" dirty="0">
-            <a:latin typeface="+mj-lt"/>
-          </a:endParaRPr>
-        </a:p>
-      </dsp:txBody>
-      <dsp:txXfrm rot="-5400000">
-        <a:off x="1696353" y="5079230"/>
-        <a:ext cx="6894810" cy="808332"/>
-      </dsp:txXfrm>
-    </dsp:sp>
-    <dsp:sp modelId="{0C172A3D-1747-485F-A12F-621E60BDAD9E}">
-      <dsp:nvSpPr>
-        <dsp:cNvPr id="0" name=""/>
-        <dsp:cNvSpPr/>
-      </dsp:nvSpPr>
-      <dsp:spPr>
-        <a:xfrm>
-          <a:off x="765" y="4944738"/>
-          <a:ext cx="1695587" cy="1077317"/>
-        </a:xfrm>
-        <a:prstGeom prst="roundRect">
-          <a:avLst/>
-        </a:prstGeom>
-        <a:solidFill>
-          <a:schemeClr val="dk2">
-            <a:hueOff val="0"/>
-            <a:satOff val="0"/>
-            <a:lumOff val="0"/>
-            <a:alphaOff val="0"/>
-          </a:schemeClr>
-        </a:solidFill>
-        <a:ln w="28575" cap="flat" cmpd="sng" algn="ctr">
-          <a:solidFill>
-            <a:schemeClr val="lt2">
-              <a:hueOff val="0"/>
-              <a:satOff val="0"/>
-              <a:lumOff val="0"/>
-              <a:alphaOff val="0"/>
-            </a:schemeClr>
-          </a:solidFill>
-          <a:prstDash val="solid"/>
-        </a:ln>
-        <a:effectLst/>
-      </dsp:spPr>
-      <dsp:style>
-        <a:lnRef idx="2">
-          <a:scrgbClr r="0" g="0" b="0"/>
-        </a:lnRef>
-        <a:fillRef idx="1">
-          <a:scrgbClr r="0" g="0" b="0"/>
-        </a:fillRef>
-        <a:effectRef idx="0">
-          <a:scrgbClr r="0" g="0" b="0"/>
-        </a:effectRef>
-        <a:fontRef idx="minor">
-          <a:schemeClr val="lt1"/>
-        </a:fontRef>
-      </dsp:style>
-      <dsp:txBody>
-        <a:bodyPr spcFirstLastPara="0" vert="horz" wrap="square" lIns="60960" tIns="30480" rIns="60960" bIns="30480" numCol="1" spcCol="1270" anchor="ctr" anchorCtr="0">
-          <a:noAutofit/>
-        </a:bodyPr>
-        <a:lstStyle/>
-        <a:p>
-          <a:pPr lvl="0" algn="ctr" defTabSz="711200">
-            <a:lnSpc>
-              <a:spcPct val="90000"/>
-            </a:lnSpc>
-            <a:spcBef>
-              <a:spcPct val="0"/>
-            </a:spcBef>
-            <a:spcAft>
-              <a:spcPct val="35000"/>
-            </a:spcAft>
-          </a:pPr>
-          <a:r>
-            <a:rPr lang="es-ES" sz="1600" b="1" kern="1200" dirty="0" smtClean="0">
-              <a:effectLst>
-                <a:outerShdw blurRad="38100" dist="38100" dir="2700000" algn="tl">
-                  <a:srgbClr val="000000">
-                    <a:alpha val="43137"/>
-                  </a:srgbClr>
-                </a:outerShdw>
-              </a:effectLst>
-            </a:rPr>
-            <a:t>Analista Funcional</a:t>
-          </a:r>
-        </a:p>
-        <a:p>
-          <a:pPr lvl="0" algn="ctr" defTabSz="711200">
-            <a:lnSpc>
-              <a:spcPct val="90000"/>
-            </a:lnSpc>
-            <a:spcBef>
-              <a:spcPct val="0"/>
-            </a:spcBef>
-            <a:spcAft>
-              <a:spcPct val="35000"/>
-            </a:spcAft>
-          </a:pPr>
-          <a:r>
-            <a:rPr lang="es-ES" sz="1600" b="1" kern="1200" dirty="0" smtClean="0">
-              <a:effectLst>
-                <a:outerShdw blurRad="38100" dist="38100" dir="2700000" algn="tl">
-                  <a:srgbClr val="000000">
-                    <a:alpha val="43137"/>
-                  </a:srgbClr>
-                </a:outerShdw>
-              </a:effectLst>
-            </a:rPr>
-            <a:t>EJR-SOFT</a:t>
-          </a:r>
-          <a:endParaRPr lang="es-PE" sz="1600" b="1" kern="1200" dirty="0">
-            <a:effectLst>
-              <a:outerShdw blurRad="38100" dist="38100" dir="2700000" algn="tl">
-                <a:srgbClr val="000000">
-                  <a:alpha val="43137"/>
-                </a:srgbClr>
-              </a:outerShdw>
-            </a:effectLst>
-          </a:endParaRPr>
-        </a:p>
-      </dsp:txBody>
-      <dsp:txXfrm>
-        <a:off x="53355" y="4997328"/>
-        <a:ext cx="1590407" cy="972137"/>
-      </dsp:txXfrm>
-    </dsp:sp>
   </dsp:spTree>
 </dsp:drawing>
 </file>
@@ -12960,18 +11920,7 @@
                           <a:ea typeface="Verdana" panose="020B0604030504040204" pitchFamily="34" charset="0"/>
                           <a:cs typeface="Verdana" panose="020B0604030504040204" pitchFamily="34" charset="0"/>
                         </a:rPr>
-                        <a:t> </a:t>
-                      </a:r>
-                      <a:r>
-                        <a:rPr lang="es-PE" sz="1200" kern="1200" dirty="0" smtClean="0">
-                          <a:solidFill>
-                            <a:schemeClr val="dk1"/>
-                          </a:solidFill>
-                          <a:latin typeface="+mj-lt"/>
-                          <a:ea typeface="Verdana" panose="020B0604030504040204" pitchFamily="34" charset="0"/>
-                          <a:cs typeface="Verdana" panose="020B0604030504040204" pitchFamily="34" charset="0"/>
-                        </a:rPr>
-                        <a:t>Plan del Proyecto</a:t>
+                        <a:t> Plan del Proyecto</a:t>
                       </a:r>
                     </a:p>
                     <a:p>
@@ -13401,18 +12350,7 @@
                           <a:ea typeface="Verdana" panose="020B0604030504040204" pitchFamily="34" charset="0"/>
                           <a:cs typeface="Verdana" panose="020B0604030504040204" pitchFamily="34" charset="0"/>
                         </a:rPr>
-                        <a:t> </a:t>
-                      </a:r>
-                      <a:r>
-                        <a:rPr lang="es-ES" sz="1200" kern="1200" baseline="0" dirty="0" smtClean="0">
-                          <a:solidFill>
-                            <a:schemeClr val="tx1"/>
-                          </a:solidFill>
-                          <a:latin typeface="+mj-lt"/>
-                          <a:ea typeface="Verdana" panose="020B0604030504040204" pitchFamily="34" charset="0"/>
-                          <a:cs typeface="Verdana" panose="020B0604030504040204" pitchFamily="34" charset="0"/>
-                        </a:rPr>
-                        <a:t>de Auditoria</a:t>
+                        <a:t> de Auditoria</a:t>
                       </a:r>
                       <a:endParaRPr lang="es-ES" sz="1200" kern="1200" dirty="0" smtClean="0">
                         <a:solidFill>
@@ -21283,18 +20221,7 @@
                           <a:ea typeface="Verdana" panose="020B0604030504040204" pitchFamily="34" charset="0"/>
                           <a:cs typeface="Verdana" panose="020B0604030504040204" pitchFamily="34" charset="0"/>
                         </a:rPr>
-                        <a:t>REGITCON Registro </a:t>
-                      </a:r>
-                      <a:r>
-                        <a:rPr lang="es-PE" sz="1200" kern="1200" dirty="0" smtClean="0">
-                          <a:solidFill>
-                            <a:schemeClr val="dk1"/>
-                          </a:solidFill>
-                          <a:latin typeface="+mj-lt"/>
-                          <a:ea typeface="Verdana" panose="020B0604030504040204" pitchFamily="34" charset="0"/>
-                          <a:cs typeface="Verdana" panose="020B0604030504040204" pitchFamily="34" charset="0"/>
-                        </a:rPr>
-                        <a:t>de Ítems de Configuración</a:t>
+                        <a:t>REGITCON Registro de Ítems de Configuración</a:t>
                       </a:r>
                       <a:endParaRPr lang="es-ES" sz="1200" kern="1200" dirty="0" smtClean="0">
                         <a:solidFill>
@@ -21578,18 +20505,7 @@
                           <a:ea typeface="Verdana" panose="020B0604030504040204" pitchFamily="34" charset="0"/>
                           <a:cs typeface="Verdana" panose="020B0604030504040204" pitchFamily="34" charset="0"/>
                         </a:rPr>
-                        <a:t>REGITCON Registro </a:t>
-                      </a:r>
-                      <a:r>
-                        <a:rPr lang="es-PE" sz="1200" kern="1200" dirty="0" smtClean="0">
-                          <a:solidFill>
-                            <a:schemeClr val="dk1"/>
-                          </a:solidFill>
-                          <a:latin typeface="+mj-lt"/>
-                          <a:ea typeface="Verdana" panose="020B0604030504040204" pitchFamily="34" charset="0"/>
-                          <a:cs typeface="Verdana" panose="020B0604030504040204" pitchFamily="34" charset="0"/>
-                        </a:rPr>
-                        <a:t>de Ítems de Configuración</a:t>
+                        <a:t>REGITCON Registro de Ítems de Configuración</a:t>
                       </a:r>
                       <a:endParaRPr lang="es-ES" sz="1200" kern="1200" dirty="0" smtClean="0">
                         <a:solidFill>
@@ -22309,18 +21225,7 @@
                           <a:ea typeface="Verdana" panose="020B0604030504040204" pitchFamily="34" charset="0"/>
                           <a:cs typeface="Verdana" panose="020B0604030504040204" pitchFamily="34" charset="0"/>
                         </a:rPr>
-                        <a:t>REGITCON Registro </a:t>
-                      </a:r>
-                      <a:r>
-                        <a:rPr lang="es-PE" sz="1200" kern="1200" dirty="0" smtClean="0">
-                          <a:solidFill>
-                            <a:schemeClr val="dk1"/>
-                          </a:solidFill>
-                          <a:latin typeface="+mj-lt"/>
-                          <a:ea typeface="Verdana" panose="020B0604030504040204" pitchFamily="34" charset="0"/>
-                          <a:cs typeface="Verdana" panose="020B0604030504040204" pitchFamily="34" charset="0"/>
-                        </a:rPr>
-                        <a:t>de Ítems de Configuración</a:t>
+                        <a:t>REGITCON Registro de Ítems de Configuración</a:t>
                       </a:r>
                       <a:endParaRPr lang="es-ES" sz="1200" kern="1200" dirty="0" smtClean="0">
                         <a:solidFill>
@@ -22615,18 +21520,7 @@
                           <a:ea typeface="Verdana" panose="020B0604030504040204" pitchFamily="34" charset="0"/>
                           <a:cs typeface="Verdana" panose="020B0604030504040204" pitchFamily="34" charset="0"/>
                         </a:rPr>
-                        <a:t>REGITCON Registro </a:t>
-                      </a:r>
-                      <a:r>
-                        <a:rPr lang="es-PE" sz="1200" kern="1200" dirty="0" smtClean="0">
-                          <a:solidFill>
-                            <a:schemeClr val="dk1"/>
-                          </a:solidFill>
-                          <a:latin typeface="+mj-lt"/>
-                          <a:ea typeface="Verdana" panose="020B0604030504040204" pitchFamily="34" charset="0"/>
-                          <a:cs typeface="Verdana" panose="020B0604030504040204" pitchFamily="34" charset="0"/>
-                        </a:rPr>
-                        <a:t>de Ítems de Configuración</a:t>
+                        <a:t>REGITCON Registro de Ítems de Configuración</a:t>
                       </a:r>
                       <a:endParaRPr lang="es-ES" sz="1200" kern="1200" dirty="0" smtClean="0">
                         <a:solidFill>
@@ -24487,18 +23381,7 @@
                           <a:ea typeface="Verdana" panose="020B0604030504040204" pitchFamily="34" charset="0"/>
                           <a:cs typeface="Verdana" panose="020B0604030504040204" pitchFamily="34" charset="0"/>
                         </a:rPr>
-                        <a:t>REGITCON Registro </a:t>
-                      </a:r>
-                      <a:r>
-                        <a:rPr lang="es-PE" sz="1200" b="1" kern="1200" dirty="0" smtClean="0">
-                          <a:solidFill>
-                            <a:schemeClr val="dk1"/>
-                          </a:solidFill>
-                          <a:latin typeface="+mj-lt"/>
-                          <a:ea typeface="Verdana" panose="020B0604030504040204" pitchFamily="34" charset="0"/>
-                          <a:cs typeface="Verdana" panose="020B0604030504040204" pitchFamily="34" charset="0"/>
-                        </a:rPr>
-                        <a:t>de Ítems de Configuración</a:t>
+                        <a:t>REGITCON Registro de Ítems de Configuración</a:t>
                       </a:r>
                       <a:endParaRPr lang="es-ES" sz="1200" b="1" kern="1200" dirty="0" smtClean="0">
                         <a:solidFill>
@@ -24879,18 +23762,7 @@
                           <a:ea typeface="Verdana" panose="020B0604030504040204" pitchFamily="34" charset="0"/>
                           <a:cs typeface="Verdana" panose="020B0604030504040204" pitchFamily="34" charset="0"/>
                         </a:rPr>
-                        <a:t>Plan </a:t>
-                      </a:r>
-                      <a:r>
-                        <a:rPr lang="es-ES" sz="1200" b="1" kern="1200" dirty="0" smtClean="0">
-                          <a:solidFill>
-                            <a:schemeClr val="dk1"/>
-                          </a:solidFill>
-                          <a:latin typeface="+mj-lt"/>
-                          <a:ea typeface="Verdana" panose="020B0604030504040204" pitchFamily="34" charset="0"/>
-                          <a:cs typeface="Verdana" panose="020B0604030504040204" pitchFamily="34" charset="0"/>
-                        </a:rPr>
-                        <a:t>del Proyecto</a:t>
+                        <a:t>Plan del Proyecto</a:t>
                       </a:r>
                     </a:p>
                   </a:txBody>
@@ -25216,18 +24088,7 @@
                           <a:ea typeface="Verdana" panose="020B0604030504040204" pitchFamily="34" charset="0"/>
                           <a:cs typeface="Verdana" panose="020B0604030504040204" pitchFamily="34" charset="0"/>
                         </a:rPr>
-                        <a:t>SOLACC Solicitud </a:t>
-                      </a:r>
-                      <a:r>
-                        <a:rPr lang="es-PE" sz="1200" b="1" kern="1200" dirty="0" smtClean="0">
-                          <a:solidFill>
-                            <a:schemeClr val="dk1"/>
-                          </a:solidFill>
-                          <a:latin typeface="+mj-lt"/>
-                          <a:ea typeface="Verdana" panose="020B0604030504040204" pitchFamily="34" charset="0"/>
-                          <a:cs typeface="Verdana" panose="020B0604030504040204" pitchFamily="34" charset="0"/>
-                        </a:rPr>
-                        <a:t>de Accesos</a:t>
+                        <a:t>SOLACC Solicitud de Accesos</a:t>
                       </a:r>
                       <a:endParaRPr lang="es-ES" sz="1200" b="1" kern="1200" dirty="0" smtClean="0">
                         <a:solidFill>
@@ -31472,29 +30333,7 @@
                           <a:ea typeface="Verdana" panose="020B0604030504040204" pitchFamily="34" charset="0"/>
                           <a:cs typeface="Verdana" panose="020B0604030504040204" pitchFamily="34" charset="0"/>
                         </a:rPr>
-                        <a:t> de una lista de ítems que se han revisado formalmente. Se obtiene al final de cada una de las fases, luego de haber sido aprobados y aceptados. Los </a:t>
-                      </a:r>
-                      <a:r>
-                        <a:rPr lang="es-MX" sz="1300" kern="1200" baseline="0" dirty="0" err="1" smtClean="0">
-                          <a:solidFill>
-                            <a:schemeClr val="dk1"/>
-                          </a:solidFill>
-                          <a:latin typeface="+mj-lt"/>
-                          <a:ea typeface="Verdana" panose="020B0604030504040204" pitchFamily="34" charset="0"/>
-                          <a:cs typeface="Verdana" panose="020B0604030504040204" pitchFamily="34" charset="0"/>
-                        </a:rPr>
-                        <a:t>Baselines</a:t>
-                      </a:r>
-                      <a:r>
-                        <a:rPr lang="es-MX" sz="1300" kern="1200" baseline="0" dirty="0" smtClean="0">
-                          <a:solidFill>
-                            <a:schemeClr val="dk1"/>
-                          </a:solidFill>
-                          <a:latin typeface="+mj-lt"/>
-                          <a:ea typeface="Verdana" panose="020B0604030504040204" pitchFamily="34" charset="0"/>
-                          <a:cs typeface="Verdana" panose="020B0604030504040204" pitchFamily="34" charset="0"/>
-                        </a:rPr>
-                        <a:t> posteriormente sirven como base para el desarrollo posterior del proyecto</a:t>
+                        <a:t> de una lista de ítems que se han revisado formalmente. Se obtiene al final de cada una de las fases, luego de haber sido aprobados y aceptados. Los Baselines posteriormente sirven como base para el desarrollo posterior del proyecto</a:t>
                       </a:r>
                       <a:endParaRPr lang="es-ES" sz="1300" kern="1200" dirty="0" smtClean="0">
                         <a:solidFill>

</xml_diff>